<commit_message>
Updating Class Diagram Link in Slides 🎉🎟️💻
</commit_message>
<xml_diff>
--- a/Ticketak presentation.pptx
+++ b/Ticketak presentation.pptx
@@ -2113,8 +2113,8 @@
         </p:nvSpPr>
         <p:spPr>
           <a:xfrm>
-            <a:off x="382063" y="685800"/>
-            <a:ext cx="6094500" cy="3429000"/>
+            <a:off x="382588" y="685800"/>
+            <a:ext cx="6094412" cy="3429000"/>
           </a:xfrm>
           <a:custGeom>
             <a:avLst/>
@@ -10810,7 +10810,7 @@
               </a:rPr>
               <a:t>Ticketak Class Diagram</a:t>
             </a:r>
-            <a:endParaRPr/>
+            <a:endParaRPr dirty="0"/>
           </a:p>
         </p:txBody>
       </p:sp>

</xml_diff>